<commit_message>
Added Presentation file to folder
</commit_message>
<xml_diff>
--- a/MSA Assessment Deck.pptx
+++ b/MSA Assessment Deck.pptx
@@ -206,7 +206,7 @@
           <a:p>
             <a:fld id="{9FB5EA18-F66C-4D75-8C80-0C1A1E868DE6}" type="datetimeFigureOut">
               <a:rPr lang="en-US" smtClean="0"/>
-              <a:t>11/19/2016</a:t>
+              <a:t>11/24/2016</a:t>
             </a:fld>
             <a:endParaRPr lang="en-US"/>
           </a:p>
@@ -1427,7 +1427,7 @@
           <a:p>
             <a:fld id="{4BFC623A-4806-45FB-9E07-894B153158FF}" type="datetimeFigureOut">
               <a:rPr lang="en-US" smtClean="0"/>
-              <a:t>11/19/2016</a:t>
+              <a:t>11/24/2016</a:t>
             </a:fld>
             <a:endParaRPr lang="en-US"/>
           </a:p>
@@ -1633,7 +1633,7 @@
           <a:p>
             <a:fld id="{4BFC623A-4806-45FB-9E07-894B153158FF}" type="datetimeFigureOut">
               <a:rPr lang="en-US" smtClean="0"/>
-              <a:t>11/19/2016</a:t>
+              <a:t>11/24/2016</a:t>
             </a:fld>
             <a:endParaRPr lang="en-US"/>
           </a:p>
@@ -1883,7 +1883,7 @@
           <a:p>
             <a:fld id="{4BFC623A-4806-45FB-9E07-894B153158FF}" type="datetimeFigureOut">
               <a:rPr lang="en-US" smtClean="0"/>
-              <a:t>11/19/2016</a:t>
+              <a:t>11/24/2016</a:t>
             </a:fld>
             <a:endParaRPr lang="en-US"/>
           </a:p>
@@ -2119,7 +2119,7 @@
           <a:p>
             <a:fld id="{4BFC623A-4806-45FB-9E07-894B153158FF}" type="datetimeFigureOut">
               <a:rPr lang="en-US" smtClean="0"/>
-              <a:t>11/19/2016</a:t>
+              <a:t>11/24/2016</a:t>
             </a:fld>
             <a:endParaRPr lang="en-US"/>
           </a:p>
@@ -2236,7 +2236,7 @@
           <a:p>
             <a:fld id="{4BFC623A-4806-45FB-9E07-894B153158FF}" type="datetimeFigureOut">
               <a:rPr lang="en-US" smtClean="0"/>
-              <a:t>11/19/2016</a:t>
+              <a:t>11/24/2016</a:t>
             </a:fld>
             <a:endParaRPr lang="en-US"/>
           </a:p>
@@ -2341,7 +2341,7 @@
           <a:p>
             <a:fld id="{4BFC623A-4806-45FB-9E07-894B153158FF}" type="datetimeFigureOut">
               <a:rPr lang="en-US" smtClean="0"/>
-              <a:t>11/19/2016</a:t>
+              <a:t>11/24/2016</a:t>
             </a:fld>
             <a:endParaRPr lang="en-US"/>
           </a:p>
@@ -2626,7 +2626,7 @@
           <a:p>
             <a:fld id="{4BFC623A-4806-45FB-9E07-894B153158FF}" type="datetimeFigureOut">
               <a:rPr lang="en-US" smtClean="0"/>
-              <a:t>11/19/2016</a:t>
+              <a:t>11/24/2016</a:t>
             </a:fld>
             <a:endParaRPr lang="en-US"/>
           </a:p>
@@ -2857,7 +2857,7 @@
           <a:p>
             <a:fld id="{4BFC623A-4806-45FB-9E07-894B153158FF}" type="datetimeFigureOut">
               <a:rPr lang="en-US" smtClean="0"/>
-              <a:t>11/19/2016</a:t>
+              <a:t>11/24/2016</a:t>
             </a:fld>
             <a:endParaRPr lang="en-US"/>
           </a:p>
@@ -3448,22 +3448,56 @@
           <a:p>
             <a:pPr algn="l"/>
             <a:r>
-              <a:rPr lang="en-US" dirty="0">
+              <a:rPr lang="en-US" dirty="0" smtClean="0">
                 <a:latin typeface="Segoe UI Light" panose="020B0502040204020203" pitchFamily="34" charset="0"/>
                 <a:cs typeface="Segoe UI Light" panose="020B0502040204020203" pitchFamily="34" charset="0"/>
               </a:rPr>
-              <a:t>&lt;Your Name&gt;</a:t>
-            </a:r>
-          </a:p>
-          <a:p>
-            <a:pPr algn="l"/>
-            <a:r>
-              <a:rPr lang="en-US" dirty="0">
+              <a:t>&lt;</a:t>
+            </a:r>
+            <a:r>
+              <a:rPr lang="en-US" dirty="0" smtClean="0"/>
+              <a:t>Hotanya Ragtah</a:t>
+            </a:r>
+            <a:r>
+              <a:rPr lang="en-US" dirty="0" smtClean="0">
                 <a:latin typeface="Segoe UI Light" panose="020B0502040204020203" pitchFamily="34" charset="0"/>
                 <a:cs typeface="Segoe UI Light" panose="020B0502040204020203" pitchFamily="34" charset="0"/>
               </a:rPr>
-              <a:t>&lt;MSA Email Address&gt;</a:t>
-            </a:r>
+              <a:t>&gt;</a:t>
+            </a:r>
+            <a:endParaRPr lang="en-US" dirty="0">
+              <a:latin typeface="Segoe UI Light" panose="020B0502040204020203" pitchFamily="34" charset="0"/>
+              <a:cs typeface="Segoe UI Light" panose="020B0502040204020203" pitchFamily="34" charset="0"/>
+            </a:endParaRPr>
+          </a:p>
+          <a:p>
+            <a:pPr algn="l"/>
+            <a:r>
+              <a:rPr lang="en-US" dirty="0" smtClean="0">
+                <a:latin typeface="Segoe UI Light" panose="020B0502040204020203" pitchFamily="34" charset="0"/>
+                <a:cs typeface="Segoe UI Light" panose="020B0502040204020203" pitchFamily="34" charset="0"/>
+              </a:rPr>
+              <a:t>&lt;</a:t>
+            </a:r>
+            <a:r>
+              <a:rPr lang="en-US" dirty="0" smtClean="0"/>
+              <a:t>h</a:t>
+            </a:r>
+            <a:r>
+              <a:rPr lang="en-US" dirty="0" smtClean="0"/>
+              <a:t>otanya_nz@hotmail.com</a:t>
+            </a:r>
+            <a:r>
+              <a:rPr lang="en-US" dirty="0" smtClean="0">
+                <a:latin typeface="Segoe UI Light" panose="020B0502040204020203" pitchFamily="34" charset="0"/>
+                <a:cs typeface="Segoe UI Light" panose="020B0502040204020203" pitchFamily="34" charset="0"/>
+              </a:rPr>
+              <a:t>&gt;</a:t>
+            </a:r>
+            <a:endParaRPr lang="en-US" dirty="0">
+              <a:latin typeface="Segoe UI Light" panose="020B0502040204020203" pitchFamily="34" charset="0"/>
+              <a:cs typeface="Segoe UI Light" panose="020B0502040204020203" pitchFamily="34" charset="0"/>
+            </a:endParaRPr>
           </a:p>
         </p:txBody>
       </p:sp>

</xml_diff>